<commit_message>
fix: out of activity box arrow for ListWeek Sequence Diagram
</commit_message>
<xml_diff>
--- a/docs/diagrams/ListWeekSequenceDiagram.pptx
+++ b/docs/diagrams/ListWeekSequenceDiagram.pptx
@@ -208,7 +208,7 @@
           <a:p>
             <a:fld id="{F5CC4B3F-88C1-4FFA-B1B6-F41C21DC6924}" type="datetimeFigureOut">
               <a:rPr lang="en-US" smtClean="0"/>
-              <a:t>10/27/2018</a:t>
+              <a:t>11/10/2018</a:t>
             </a:fld>
             <a:endParaRPr lang="en-US"/>
           </a:p>
@@ -654,7 +654,7 @@
           <a:p>
             <a:fld id="{78C97017-6FC3-485B-9764-EAC9E56C1D49}" type="datetimeFigureOut">
               <a:rPr lang="en-US" smtClean="0"/>
-              <a:t>10/27/2018</a:t>
+              <a:t>11/10/2018</a:t>
             </a:fld>
             <a:endParaRPr lang="en-US"/>
           </a:p>
@@ -822,7 +822,7 @@
           <a:p>
             <a:fld id="{78C97017-6FC3-485B-9764-EAC9E56C1D49}" type="datetimeFigureOut">
               <a:rPr lang="en-US" smtClean="0"/>
-              <a:t>10/27/2018</a:t>
+              <a:t>11/10/2018</a:t>
             </a:fld>
             <a:endParaRPr lang="en-US"/>
           </a:p>
@@ -1000,7 +1000,7 @@
           <a:p>
             <a:fld id="{78C97017-6FC3-485B-9764-EAC9E56C1D49}" type="datetimeFigureOut">
               <a:rPr lang="en-US" smtClean="0"/>
-              <a:t>10/27/2018</a:t>
+              <a:t>11/10/2018</a:t>
             </a:fld>
             <a:endParaRPr lang="en-US"/>
           </a:p>
@@ -1168,7 +1168,7 @@
           <a:p>
             <a:fld id="{78C97017-6FC3-485B-9764-EAC9E56C1D49}" type="datetimeFigureOut">
               <a:rPr lang="en-US" smtClean="0"/>
-              <a:t>10/27/2018</a:t>
+              <a:t>11/10/2018</a:t>
             </a:fld>
             <a:endParaRPr lang="en-US"/>
           </a:p>
@@ -1413,7 +1413,7 @@
           <a:p>
             <a:fld id="{78C97017-6FC3-485B-9764-EAC9E56C1D49}" type="datetimeFigureOut">
               <a:rPr lang="en-US" smtClean="0"/>
-              <a:t>10/27/2018</a:t>
+              <a:t>11/10/2018</a:t>
             </a:fld>
             <a:endParaRPr lang="en-US"/>
           </a:p>
@@ -1698,7 +1698,7 @@
           <a:p>
             <a:fld id="{78C97017-6FC3-485B-9764-EAC9E56C1D49}" type="datetimeFigureOut">
               <a:rPr lang="en-US" smtClean="0"/>
-              <a:t>10/27/2018</a:t>
+              <a:t>11/10/2018</a:t>
             </a:fld>
             <a:endParaRPr lang="en-US"/>
           </a:p>
@@ -2117,7 +2117,7 @@
           <a:p>
             <a:fld id="{78C97017-6FC3-485B-9764-EAC9E56C1D49}" type="datetimeFigureOut">
               <a:rPr lang="en-US" smtClean="0"/>
-              <a:t>10/27/2018</a:t>
+              <a:t>11/10/2018</a:t>
             </a:fld>
             <a:endParaRPr lang="en-US"/>
           </a:p>
@@ -2234,7 +2234,7 @@
           <a:p>
             <a:fld id="{78C97017-6FC3-485B-9764-EAC9E56C1D49}" type="datetimeFigureOut">
               <a:rPr lang="en-US" smtClean="0"/>
-              <a:t>10/27/2018</a:t>
+              <a:t>11/10/2018</a:t>
             </a:fld>
             <a:endParaRPr lang="en-US"/>
           </a:p>
@@ -2329,7 +2329,7 @@
           <a:p>
             <a:fld id="{78C97017-6FC3-485B-9764-EAC9E56C1D49}" type="datetimeFigureOut">
               <a:rPr lang="en-US" smtClean="0"/>
-              <a:t>10/27/2018</a:t>
+              <a:t>11/10/2018</a:t>
             </a:fld>
             <a:endParaRPr lang="en-US"/>
           </a:p>
@@ -2604,7 +2604,7 @@
           <a:p>
             <a:fld id="{78C97017-6FC3-485B-9764-EAC9E56C1D49}" type="datetimeFigureOut">
               <a:rPr lang="en-US" smtClean="0"/>
-              <a:t>10/27/2018</a:t>
+              <a:t>11/10/2018</a:t>
             </a:fld>
             <a:endParaRPr lang="en-US"/>
           </a:p>
@@ -2856,7 +2856,7 @@
           <a:p>
             <a:fld id="{78C97017-6FC3-485B-9764-EAC9E56C1D49}" type="datetimeFigureOut">
               <a:rPr lang="en-US" smtClean="0"/>
-              <a:t>10/27/2018</a:t>
+              <a:t>11/10/2018</a:t>
             </a:fld>
             <a:endParaRPr lang="en-US"/>
           </a:p>
@@ -3067,7 +3067,7 @@
           <a:p>
             <a:fld id="{78C97017-6FC3-485B-9764-EAC9E56C1D49}" type="datetimeFigureOut">
               <a:rPr lang="en-US" smtClean="0"/>
-              <a:t>10/27/2018</a:t>
+              <a:t>11/10/2018</a:t>
             </a:fld>
             <a:endParaRPr lang="en-US"/>
           </a:p>
@@ -4381,8 +4381,8 @@
         </p:nvCxnSpPr>
         <p:spPr>
           <a:xfrm flipV="1">
-            <a:off x="4110352" y="4286678"/>
-            <a:ext cx="4072433" cy="12411"/>
+            <a:off x="4106342" y="4253861"/>
+            <a:ext cx="4052849" cy="18377"/>
           </a:xfrm>
           <a:prstGeom prst="straightConnector1">
             <a:avLst/>

</xml_diff>

<commit_message>
fix: ListWeek sequence diagram
</commit_message>
<xml_diff>
--- a/docs/diagrams/ListWeekSequenceDiagram.pptx
+++ b/docs/diagrams/ListWeekSequenceDiagram.pptx
@@ -3819,7 +3819,7 @@
         </p:nvCxnSpPr>
         <p:spPr>
           <a:xfrm>
-            <a:off x="4065940" y="2580254"/>
+            <a:off x="4041249" y="2593466"/>
             <a:ext cx="0" cy="2648981"/>
           </a:xfrm>
           <a:prstGeom prst="line">
@@ -3887,13 +3887,15 @@
       <p:cxnSp>
         <p:nvCxnSpPr>
           <p:cNvPr id="25" name="Straight Arrow Connector 24"/>
-          <p:cNvCxnSpPr/>
+          <p:cNvCxnSpPr>
+            <a:cxnSpLocks/>
+          </p:cNvCxnSpPr>
           <p:nvPr/>
         </p:nvCxnSpPr>
         <p:spPr>
           <a:xfrm flipV="1">
-            <a:off x="80391" y="1739951"/>
-            <a:ext cx="1596514" cy="1"/>
+            <a:off x="89899" y="1753046"/>
+            <a:ext cx="1622751" cy="8618"/>
           </a:xfrm>
           <a:prstGeom prst="straightConnector1">
             <a:avLst/>
@@ -3978,7 +3980,7 @@
         </p:nvSpPr>
         <p:spPr>
           <a:xfrm>
-            <a:off x="2084740" y="2869410"/>
+            <a:off x="2215793" y="2816330"/>
             <a:ext cx="855809" cy="215444"/>
           </a:xfrm>
           <a:prstGeom prst="rect">
@@ -4094,7 +4096,7 @@
         </p:nvSpPr>
         <p:spPr>
           <a:xfrm>
-            <a:off x="7732496" y="980054"/>
+            <a:off x="7958546" y="981633"/>
             <a:ext cx="1030504" cy="346760"/>
           </a:xfrm>
           <a:prstGeom prst="rect">
@@ -4161,7 +4163,7 @@
         </p:nvCxnSpPr>
         <p:spPr>
           <a:xfrm>
-            <a:off x="80391" y="3113654"/>
+            <a:off x="71469" y="3024298"/>
             <a:ext cx="3909349" cy="0"/>
           </a:xfrm>
           <a:prstGeom prst="straightConnector1">
@@ -4197,8 +4199,8 @@
         </p:nvSpPr>
         <p:spPr>
           <a:xfrm>
-            <a:off x="3970810" y="3008568"/>
-            <a:ext cx="140083" cy="2096830"/>
+            <a:off x="3970810" y="3024298"/>
+            <a:ext cx="140083" cy="2089191"/>
           </a:xfrm>
           <a:prstGeom prst="rect">
             <a:avLst/>
@@ -4244,7 +4246,7 @@
         </p:nvCxnSpPr>
         <p:spPr>
           <a:xfrm>
-            <a:off x="8247748" y="1318712"/>
+            <a:off x="8534400" y="1323755"/>
             <a:ext cx="0" cy="2830598"/>
           </a:xfrm>
           <a:prstGeom prst="line">
@@ -4284,7 +4286,7 @@
         </p:nvSpPr>
         <p:spPr>
           <a:xfrm>
-            <a:off x="8153400" y="4111038"/>
+            <a:off x="8458207" y="4111038"/>
             <a:ext cx="152393" cy="150195"/>
           </a:xfrm>
           <a:prstGeom prst="rect">
@@ -4342,9 +4344,9 @@
           <p:nvPr/>
         </p:nvCxnSpPr>
         <p:spPr>
-          <a:xfrm>
-            <a:off x="4132225" y="4125346"/>
-            <a:ext cx="4021175" cy="0"/>
+          <a:xfrm flipV="1">
+            <a:off x="4110353" y="4125346"/>
+            <a:ext cx="4347854" cy="6762"/>
           </a:xfrm>
           <a:prstGeom prst="straightConnector1">
             <a:avLst/>
@@ -4381,8 +4383,8 @@
         </p:nvCxnSpPr>
         <p:spPr>
           <a:xfrm flipV="1">
-            <a:off x="4106342" y="4253861"/>
-            <a:ext cx="4052849" cy="18377"/>
+            <a:off x="4110353" y="4253862"/>
+            <a:ext cx="4353645" cy="7371"/>
           </a:xfrm>
           <a:prstGeom prst="straightConnector1">
             <a:avLst/>
@@ -4424,7 +4426,7 @@
         </p:nvCxnSpPr>
         <p:spPr>
           <a:xfrm>
-            <a:off x="80391" y="5105400"/>
+            <a:off x="53863" y="5105397"/>
             <a:ext cx="3909349" cy="0"/>
           </a:xfrm>
           <a:prstGeom prst="straightConnector1">
@@ -4913,7 +4915,7 @@
         <p:spPr>
           <a:xfrm>
             <a:off x="3980818" y="1979728"/>
-            <a:ext cx="161322" cy="829127"/>
+            <a:ext cx="129535" cy="829127"/>
           </a:xfrm>
           <a:prstGeom prst="rect">
             <a:avLst/>
@@ -4963,7 +4965,7 @@
         <p:spPr>
           <a:xfrm>
             <a:off x="1894342" y="2797506"/>
-            <a:ext cx="2167137" cy="11349"/>
+            <a:ext cx="2151244" cy="11349"/>
           </a:xfrm>
           <a:prstGeom prst="straightConnector1">
             <a:avLst/>
@@ -5002,8 +5004,8 @@
         </p:nvCxnSpPr>
         <p:spPr>
           <a:xfrm>
-            <a:off x="4161612" y="4648200"/>
-            <a:ext cx="2325234" cy="0"/>
+            <a:off x="4110353" y="4648200"/>
+            <a:ext cx="2376493" cy="0"/>
           </a:xfrm>
           <a:prstGeom prst="straightConnector1">
             <a:avLst/>
@@ -5133,8 +5135,8 @@
         </p:nvSpPr>
         <p:spPr>
           <a:xfrm>
-            <a:off x="4237812" y="2932966"/>
-            <a:ext cx="3548592" cy="215444"/>
+            <a:off x="4198646" y="2961213"/>
+            <a:ext cx="4228959" cy="215444"/>
           </a:xfrm>
           <a:prstGeom prst="rect">
             <a:avLst/>
@@ -5183,7 +5185,15 @@
             </a:r>
             <a:r>
               <a:rPr lang="en-US" dirty="0"/>
-              <a:t>(d))</a:t>
+              <a:t>(</a:t>
+            </a:r>
+            <a:r>
+              <a:rPr lang="en-US" dirty="0" err="1"/>
+              <a:t>dateName</a:t>
+            </a:r>
+            <a:r>
+              <a:rPr lang="en-US" dirty="0"/>
+              <a:t>))</a:t>
             </a:r>
           </a:p>
         </p:txBody>
@@ -5202,7 +5212,7 @@
         </p:nvSpPr>
         <p:spPr>
           <a:xfrm>
-            <a:off x="4129202" y="3028199"/>
+            <a:off x="4129647" y="3073280"/>
             <a:ext cx="137997" cy="140367"/>
           </a:xfrm>
           <a:custGeom>
@@ -5709,8 +5719,8 @@
         </p:nvSpPr>
         <p:spPr>
           <a:xfrm>
-            <a:off x="4423864" y="3222334"/>
-            <a:ext cx="1681348" cy="215444"/>
+            <a:off x="4423863" y="3222334"/>
+            <a:ext cx="2313803" cy="215444"/>
           </a:xfrm>
           <a:prstGeom prst="rect">
             <a:avLst/>
@@ -5740,17 +5750,25 @@
             </a:r>
             <a:r>
               <a:rPr lang="en-US" dirty="0"/>
-              <a:t>(d))</a:t>
-            </a:r>
-          </a:p>
-        </p:txBody>
-      </p:sp>
-      <p:sp>
-        <p:nvSpPr>
-          <p:cNvPr id="96" name="TextBox 95">
+              <a:t>(</a:t>
+            </a:r>
+            <a:r>
+              <a:rPr lang="en-US" dirty="0" err="1"/>
+              <a:t>dateName</a:t>
+            </a:r>
+            <a:r>
+              <a:rPr lang="en-US" dirty="0"/>
+              <a:t>)</a:t>
+            </a:r>
+          </a:p>
+        </p:txBody>
+      </p:sp>
+      <p:sp>
+        <p:nvSpPr>
+          <p:cNvPr id="97" name="TextBox 96">
             <a:extLst>
               <a:ext uri="{FF2B5EF4-FFF2-40B4-BE49-F238E27FC236}">
-                <a16:creationId xmlns:a16="http://schemas.microsoft.com/office/drawing/2014/main" id="{A8B1DA2F-C8E5-4C1C-A8D6-F53868FFD2D1}"/>
+                <a16:creationId xmlns:a16="http://schemas.microsoft.com/office/drawing/2014/main" id="{A65C4849-C7E6-4E0D-9FBC-5531877AC4EE}"/>
               </a:ext>
             </a:extLst>
           </p:cNvPr>
@@ -5759,8 +5777,8 @@
         </p:nvSpPr>
         <p:spPr>
           <a:xfrm>
-            <a:off x="4159701" y="3872046"/>
-            <a:ext cx="713301" cy="215444"/>
+            <a:off x="3532612" y="3627471"/>
+            <a:ext cx="1519860" cy="215444"/>
           </a:xfrm>
           <a:prstGeom prst="rect">
             <a:avLst/>
@@ -5786,54 +5804,7 @@
           <a:p>
             <a:r>
               <a:rPr lang="en-US" dirty="0" err="1"/>
-              <a:t>dateList</a:t>
-            </a:r>
-            <a:endParaRPr lang="en-US" dirty="0"/>
-          </a:p>
-        </p:txBody>
-      </p:sp>
-      <p:sp>
-        <p:nvSpPr>
-          <p:cNvPr id="97" name="TextBox 96">
-            <a:extLst>
-              <a:ext uri="{FF2B5EF4-FFF2-40B4-BE49-F238E27FC236}">
-                <a16:creationId xmlns:a16="http://schemas.microsoft.com/office/drawing/2014/main" id="{A65C4849-C7E6-4E0D-9FBC-5531877AC4EE}"/>
-              </a:ext>
-            </a:extLst>
-          </p:cNvPr>
-          <p:cNvSpPr txBox="1"/>
-          <p:nvPr/>
-        </p:nvSpPr>
-        <p:spPr>
-          <a:xfrm>
-            <a:off x="4247987" y="3617808"/>
-            <a:ext cx="1519860" cy="215444"/>
-          </a:xfrm>
-          <a:prstGeom prst="rect">
-            <a:avLst/>
-          </a:prstGeom>
-          <a:noFill/>
-        </p:spPr>
-        <p:txBody>
-          <a:bodyPr wrap="square" lIns="0" tIns="0" rIns="0" bIns="0" rtlCol="0">
-            <a:spAutoFit/>
-          </a:bodyPr>
-          <a:lstStyle>
-            <a:defPPr>
-              <a:defRPr lang="en-US"/>
-            </a:defPPr>
-            <a:lvl1pPr algn="r">
-              <a:defRPr sz="1400">
-                <a:solidFill>
-                  <a:srgbClr val="0070C0"/>
-                </a:solidFill>
-              </a:defRPr>
-            </a:lvl1pPr>
-          </a:lstStyle>
-          <a:p>
-            <a:r>
-              <a:rPr lang="en-US" dirty="0" err="1"/>
-              <a:t>numDaysTillSunday</a:t>
+              <a:t>numDays</a:t>
             </a:r>
             <a:endParaRPr lang="en-US" dirty="0"/>
           </a:p>

</xml_diff>